<commit_message>
Estetical changes to text file
</commit_message>
<xml_diff>
--- a/3D_printing_radonica.pptx
+++ b/3D_printing_radonica.pptx
@@ -29850,20 +29850,20 @@
 </file>
 
 <file path=customXml/item1.xml><?xml version="1.0" encoding="utf-8"?>
-<p:properties xmlns:p="http://schemas.microsoft.com/office/2006/metadata/properties" xmlns:xsi="http://www.w3.org/2001/XMLSchema-instance" xmlns:pc="http://schemas.microsoft.com/office/infopath/2007/PartnerControls">
-  <documentManagement>
-    <MediaServiceKeyPoints xmlns="71af3243-3dd4-4a8d-8c0d-dd76da1f02a5" xsi:nil="true"/>
-  </documentManagement>
-</p:properties>
-</file>
-
-<file path=customXml/item2.xml><?xml version="1.0" encoding="utf-8"?>
 <?mso-contentType ?>
 <FormTemplates xmlns="http://schemas.microsoft.com/sharepoint/v3/contenttype/forms">
   <Display>DocumentLibraryForm</Display>
   <Edit>DocumentLibraryForm</Edit>
   <New>DocumentLibraryForm</New>
 </FormTemplates>
+</file>
+
+<file path=customXml/item2.xml><?xml version="1.0" encoding="utf-8"?>
+<p:properties xmlns:p="http://schemas.microsoft.com/office/2006/metadata/properties" xmlns:xsi="http://www.w3.org/2001/XMLSchema-instance" xmlns:pc="http://schemas.microsoft.com/office/infopath/2007/PartnerControls">
+  <documentManagement>
+    <MediaServiceKeyPoints xmlns="71af3243-3dd4-4a8d-8c0d-dd76da1f02a5" xsi:nil="true"/>
+  </documentManagement>
+</p:properties>
 </file>
 
 <file path=customXml/item3.xml><?xml version="1.0" encoding="utf-8"?>
@@ -30078,19 +30078,19 @@
 </file>
 
 <file path=customXml/itemProps1.xml><?xml version="1.0" encoding="utf-8"?>
+<ds:datastoreItem xmlns:ds="http://schemas.openxmlformats.org/officeDocument/2006/customXml" ds:itemID="{5B26E0C9-B2AA-42E6-97B6-E1B7D9EAF129}">
+  <ds:schemaRefs>
+    <ds:schemaRef ds:uri="http://schemas.microsoft.com/sharepoint/v3/contenttype/forms"/>
+  </ds:schemaRefs>
+</ds:datastoreItem>
+</file>
+
+<file path=customXml/itemProps2.xml><?xml version="1.0" encoding="utf-8"?>
 <ds:datastoreItem xmlns:ds="http://schemas.openxmlformats.org/officeDocument/2006/customXml" ds:itemID="{F5757914-1161-4661-9696-421FD6935CDD}">
   <ds:schemaRefs>
     <ds:schemaRef ds:uri="http://schemas.microsoft.com/office/2006/metadata/properties"/>
     <ds:schemaRef ds:uri="http://schemas.microsoft.com/office/infopath/2007/PartnerControls"/>
     <ds:schemaRef ds:uri="71af3243-3dd4-4a8d-8c0d-dd76da1f02a5"/>
-  </ds:schemaRefs>
-</ds:datastoreItem>
-</file>
-
-<file path=customXml/itemProps2.xml><?xml version="1.0" encoding="utf-8"?>
-<ds:datastoreItem xmlns:ds="http://schemas.openxmlformats.org/officeDocument/2006/customXml" ds:itemID="{5B26E0C9-B2AA-42E6-97B6-E1B7D9EAF129}">
-  <ds:schemaRefs>
-    <ds:schemaRef ds:uri="http://schemas.microsoft.com/sharepoint/v3/contenttype/forms"/>
   </ds:schemaRefs>
 </ds:datastoreItem>
 </file>

</xml_diff>

<commit_message>
Added 3D printing examples
</commit_message>
<xml_diff>
--- a/3D_printing_radonica.pptx
+++ b/3D_printing_radonica.pptx
@@ -5,10 +5,10 @@
     <p:sldMasterId id="2147483648" r:id="rId4"/>
   </p:sldMasterIdLst>
   <p:notesMasterIdLst>
-    <p:notesMasterId r:id="rId21"/>
+    <p:notesMasterId r:id="rId22"/>
   </p:notesMasterIdLst>
   <p:handoutMasterIdLst>
-    <p:handoutMasterId r:id="rId22"/>
+    <p:handoutMasterId r:id="rId23"/>
   </p:handoutMasterIdLst>
   <p:sldIdLst>
     <p:sldId id="256" r:id="rId5"/>
@@ -19,14 +19,15 @@
     <p:sldId id="294" r:id="rId10"/>
     <p:sldId id="321" r:id="rId11"/>
     <p:sldId id="322" r:id="rId12"/>
-    <p:sldId id="296" r:id="rId13"/>
-    <p:sldId id="323" r:id="rId14"/>
-    <p:sldId id="325" r:id="rId15"/>
-    <p:sldId id="298" r:id="rId16"/>
-    <p:sldId id="297" r:id="rId17"/>
-    <p:sldId id="326" r:id="rId18"/>
-    <p:sldId id="300" r:id="rId19"/>
-    <p:sldId id="269" r:id="rId20"/>
+    <p:sldId id="327" r:id="rId13"/>
+    <p:sldId id="296" r:id="rId14"/>
+    <p:sldId id="323" r:id="rId15"/>
+    <p:sldId id="325" r:id="rId16"/>
+    <p:sldId id="298" r:id="rId17"/>
+    <p:sldId id="297" r:id="rId18"/>
+    <p:sldId id="326" r:id="rId19"/>
+    <p:sldId id="300" r:id="rId20"/>
+    <p:sldId id="269" r:id="rId21"/>
   </p:sldIdLst>
   <p:sldSz cx="12192000" cy="6858000"/>
   <p:notesSz cx="6858000" cy="9144000"/>
@@ -241,7 +242,7 @@
           <a:p>
             <a:fld id="{1CA5457B-CDAE-4DEB-AEC8-C82DE2312E37}" type="datetimeFigureOut">
               <a:rPr lang="en-US" smtClean="0"/>
-              <a:t>11/4/2021</a:t>
+              <a:t>11/8/2021</a:t>
             </a:fld>
             <a:endParaRPr lang="en-US"/>
           </a:p>
@@ -418,7 +419,7 @@
           <a:p>
             <a:fld id="{090B78EA-28CE-41D8-9043-90E391E5F567}" type="datetimeFigureOut">
               <a:rPr lang="en-US" noProof="0" smtClean="0"/>
-              <a:t>11/4/2021</a:t>
+              <a:t>11/8/2021</a:t>
             </a:fld>
             <a:endParaRPr lang="en-US" noProof="0"/>
           </a:p>
@@ -25642,6 +25643,253 @@
           <a:p>
             <a:r>
               <a:rPr lang="en-US" sz="4000"/>
+              <a:t>Prednosti tehnologije 3D printanja:</a:t>
+            </a:r>
+          </a:p>
+        </p:txBody>
+      </p:sp>
+      <p:sp>
+        <p:nvSpPr>
+          <p:cNvPr id="10" name="Text Placeholder 9">
+            <a:extLst>
+              <a:ext uri="{FF2B5EF4-FFF2-40B4-BE49-F238E27FC236}">
+                <a16:creationId xmlns:a16="http://schemas.microsoft.com/office/drawing/2014/main" id="{EF2BC084-E6DB-4DE7-B309-042A85EBA700}"/>
+              </a:ext>
+            </a:extLst>
+          </p:cNvPr>
+          <p:cNvSpPr>
+            <a:spLocks noGrp="1"/>
+          </p:cNvSpPr>
+          <p:nvPr>
+            <p:ph type="body" sz="quarter" idx="13"/>
+          </p:nvPr>
+        </p:nvSpPr>
+        <p:spPr>
+          <a:xfrm>
+            <a:off x="828812" y="1526968"/>
+            <a:ext cx="4445552" cy="4788107"/>
+          </a:xfrm>
+        </p:spPr>
+        <p:txBody>
+          <a:bodyPr/>
+          <a:lstStyle/>
+          <a:p>
+            <a:r>
+              <a:rPr lang="en-US" sz="2400">
+                <a:latin typeface="Bahnschrift" panose="020B0502040204020203" pitchFamily="34" charset="0"/>
+              </a:rPr>
+              <a:t>Fleksibilan dizajn modela</a:t>
+            </a:r>
+          </a:p>
+          <a:p>
+            <a:r>
+              <a:rPr lang="en-US" sz="2400">
+                <a:latin typeface="Bahnschrift" panose="020B0502040204020203" pitchFamily="34" charset="0"/>
+              </a:rPr>
+              <a:t>Brzo prototipiranje</a:t>
+            </a:r>
+          </a:p>
+          <a:p>
+            <a:r>
+              <a:rPr lang="en-US" sz="2400">
+                <a:latin typeface="Bahnschrift" panose="020B0502040204020203" pitchFamily="34" charset="0"/>
+              </a:rPr>
+              <a:t>Proizvodnja po potrebi</a:t>
+            </a:r>
+          </a:p>
+          <a:p>
+            <a:r>
+              <a:rPr lang="en-US" sz="2400">
+                <a:latin typeface="Bahnschrift" panose="020B0502040204020203" pitchFamily="34" charset="0"/>
+              </a:rPr>
+              <a:t>Različiti materijali</a:t>
+            </a:r>
+          </a:p>
+          <a:p>
+            <a:r>
+              <a:rPr lang="en-US" sz="2400">
+                <a:latin typeface="Bahnschrift" panose="020B0502040204020203" pitchFamily="34" charset="0"/>
+              </a:rPr>
+              <a:t>Efikasna proizvodnja</a:t>
+            </a:r>
+          </a:p>
+          <a:p>
+            <a:r>
+              <a:rPr lang="en-US" sz="2400">
+                <a:latin typeface="Bahnschrift" panose="020B0502040204020203" pitchFamily="34" charset="0"/>
+              </a:rPr>
+              <a:t>Relativno niska cijena</a:t>
+            </a:r>
+          </a:p>
+          <a:p>
+            <a:r>
+              <a:rPr lang="en-US" sz="2400">
+                <a:latin typeface="Bahnschrift" panose="020B0502040204020203" pitchFamily="34" charset="0"/>
+              </a:rPr>
+              <a:t>Pristupačnost</a:t>
+            </a:r>
+          </a:p>
+        </p:txBody>
+      </p:sp>
+      <p:sp>
+        <p:nvSpPr>
+          <p:cNvPr id="2" name="Slide Number Placeholder 1">
+            <a:extLst>
+              <a:ext uri="{FF2B5EF4-FFF2-40B4-BE49-F238E27FC236}">
+                <a16:creationId xmlns:a16="http://schemas.microsoft.com/office/drawing/2014/main" id="{BE9800F6-D571-48C4-8466-12AA1ADB6599}"/>
+              </a:ext>
+            </a:extLst>
+          </p:cNvPr>
+          <p:cNvSpPr>
+            <a:spLocks noGrp="1"/>
+          </p:cNvSpPr>
+          <p:nvPr>
+            <p:ph type="sldNum" sz="quarter" idx="12"/>
+          </p:nvPr>
+        </p:nvSpPr>
+        <p:spPr/>
+        <p:txBody>
+          <a:bodyPr/>
+          <a:lstStyle/>
+          <a:p>
+            <a:fld id="{C263D6C4-4840-40CC-AC84-17E24B3B7BDE}" type="slidenum">
+              <a:rPr lang="en-US" smtClean="0"/>
+              <a:pPr/>
+              <a:t>10</a:t>
+            </a:fld>
+            <a:endParaRPr lang="en-US"/>
+          </a:p>
+        </p:txBody>
+      </p:sp>
+      <p:pic>
+        <p:nvPicPr>
+          <p:cNvPr id="4" name="Picture 3">
+            <a:extLst>
+              <a:ext uri="{FF2B5EF4-FFF2-40B4-BE49-F238E27FC236}">
+                <a16:creationId xmlns:a16="http://schemas.microsoft.com/office/drawing/2014/main" id="{D8298E14-2DD4-4BE9-850D-FBD62CDE77E6}"/>
+              </a:ext>
+            </a:extLst>
+          </p:cNvPr>
+          <p:cNvPicPr>
+            <a:picLocks noChangeAspect="1"/>
+          </p:cNvPicPr>
+          <p:nvPr/>
+        </p:nvPicPr>
+        <p:blipFill rotWithShape="1">
+          <a:blip r:embed="rId2"/>
+          <a:srcRect l="24298" b="5789"/>
+          <a:stretch/>
+        </p:blipFill>
+        <p:spPr>
+          <a:xfrm>
+            <a:off x="6096000" y="1568464"/>
+            <a:ext cx="4991147" cy="4012619"/>
+          </a:xfrm>
+          <a:prstGeom prst="rect">
+            <a:avLst/>
+          </a:prstGeom>
+          <a:solidFill>
+            <a:srgbClr val="FFFFFF">
+              <a:shade val="85000"/>
+            </a:srgbClr>
+          </a:solidFill>
+          <a:ln w="88900" cap="sq">
+            <a:solidFill>
+              <a:srgbClr val="FFFFFF"/>
+            </a:solidFill>
+            <a:miter lim="800000"/>
+          </a:ln>
+          <a:effectLst>
+            <a:outerShdw blurRad="55000" dist="18000" dir="5400000" algn="tl" rotWithShape="0">
+              <a:srgbClr val="000000">
+                <a:alpha val="40000"/>
+              </a:srgbClr>
+            </a:outerShdw>
+          </a:effectLst>
+          <a:scene3d>
+            <a:camera prst="orthographicFront"/>
+            <a:lightRig rig="twoPt" dir="t">
+              <a:rot lat="0" lon="0" rev="7200000"/>
+            </a:lightRig>
+          </a:scene3d>
+          <a:sp3d>
+            <a:bevelT w="25400" h="19050"/>
+            <a:contourClr>
+              <a:srgbClr val="FFFFFF"/>
+            </a:contourClr>
+          </a:sp3d>
+        </p:spPr>
+      </p:pic>
+    </p:spTree>
+    <p:extLst>
+      <p:ext uri="{BB962C8B-B14F-4D97-AF65-F5344CB8AC3E}">
+        <p14:creationId xmlns:p14="http://schemas.microsoft.com/office/powerpoint/2010/main" val="741791448"/>
+      </p:ext>
+    </p:extLst>
+  </p:cSld>
+  <p:clrMapOvr>
+    <a:masterClrMapping/>
+  </p:clrMapOvr>
+  <mc:AlternateContent xmlns:mc="http://schemas.openxmlformats.org/markup-compatibility/2006" xmlns:p14="http://schemas.microsoft.com/office/powerpoint/2010/main">
+    <mc:Choice Requires="p14">
+      <p:transition spd="med" p14:dur="700">
+        <p:fade/>
+      </p:transition>
+    </mc:Choice>
+    <mc:Fallback xmlns="">
+      <p:transition spd="med">
+        <p:fade/>
+      </p:transition>
+    </mc:Fallback>
+  </mc:AlternateContent>
+</p:sld>
+</file>
+
+<file path=ppt/slides/slide11.xml><?xml version="1.0" encoding="utf-8"?>
+<p:sld xmlns:a="http://schemas.openxmlformats.org/drawingml/2006/main" xmlns:r="http://schemas.openxmlformats.org/officeDocument/2006/relationships" xmlns:p="http://schemas.openxmlformats.org/presentationml/2006/main">
+  <p:cSld>
+    <p:spTree>
+      <p:nvGrpSpPr>
+        <p:cNvPr id="1" name=""/>
+        <p:cNvGrpSpPr/>
+        <p:nvPr/>
+      </p:nvGrpSpPr>
+      <p:grpSpPr>
+        <a:xfrm>
+          <a:off x="0" y="0"/>
+          <a:ext cx="0" cy="0"/>
+          <a:chOff x="0" y="0"/>
+          <a:chExt cx="0" cy="0"/>
+        </a:xfrm>
+      </p:grpSpPr>
+      <p:sp>
+        <p:nvSpPr>
+          <p:cNvPr id="7" name="Title 6">
+            <a:extLst>
+              <a:ext uri="{FF2B5EF4-FFF2-40B4-BE49-F238E27FC236}">
+                <a16:creationId xmlns:a16="http://schemas.microsoft.com/office/drawing/2014/main" id="{7875C19A-1AAE-476A-A316-A2CF92D763D3}"/>
+              </a:ext>
+            </a:extLst>
+          </p:cNvPr>
+          <p:cNvSpPr>
+            <a:spLocks noGrp="1"/>
+          </p:cNvSpPr>
+          <p:nvPr>
+            <p:ph type="title"/>
+          </p:nvPr>
+        </p:nvSpPr>
+        <p:spPr>
+          <a:xfrm>
+            <a:off x="444500" y="542925"/>
+            <a:ext cx="11214100" cy="646331"/>
+          </a:xfrm>
+        </p:spPr>
+        <p:txBody>
+          <a:bodyPr/>
+          <a:lstStyle/>
+          <a:p>
+            <a:r>
+              <a:rPr lang="en-US" sz="4000"/>
               <a:t>Nedostaci tehnologije 3D printanja:</a:t>
             </a:r>
           </a:p>
@@ -25730,7 +25978,7 @@
             <a:fld id="{C263D6C4-4840-40CC-AC84-17E24B3B7BDE}" type="slidenum">
               <a:rPr lang="en-US" smtClean="0"/>
               <a:pPr/>
-              <a:t>10</a:t>
+              <a:t>11</a:t>
             </a:fld>
             <a:endParaRPr lang="en-US"/>
           </a:p>
@@ -25821,7 +26069,7 @@
 </p:sld>
 </file>
 
-<file path=ppt/slides/slide11.xml><?xml version="1.0" encoding="utf-8"?>
+<file path=ppt/slides/slide12.xml><?xml version="1.0" encoding="utf-8"?>
 <p:sld xmlns:a="http://schemas.openxmlformats.org/drawingml/2006/main" xmlns:r="http://schemas.openxmlformats.org/officeDocument/2006/relationships" xmlns:p="http://schemas.openxmlformats.org/presentationml/2006/main">
   <p:cSld>
     <p:spTree>
@@ -25891,7 +26139,7 @@
             <a:fld id="{C263D6C4-4840-40CC-AC84-17E24B3B7BDE}" type="slidenum">
               <a:rPr lang="en-US" noProof="0" smtClean="0"/>
               <a:pPr/>
-              <a:t>11</a:t>
+              <a:t>12</a:t>
             </a:fld>
             <a:endParaRPr lang="en-US" noProof="0"/>
           </a:p>
@@ -25937,10 +26185,22 @@
   <p:clrMapOvr>
     <a:masterClrMapping/>
   </p:clrMapOvr>
+  <mc:AlternateContent xmlns:mc="http://schemas.openxmlformats.org/markup-compatibility/2006">
+    <mc:Choice xmlns:p14="http://schemas.microsoft.com/office/powerpoint/2010/main" Requires="p14">
+      <p:transition spd="med" p14:dur="700">
+        <p:fade/>
+      </p:transition>
+    </mc:Choice>
+    <mc:Fallback>
+      <p:transition spd="med">
+        <p:fade/>
+      </p:transition>
+    </mc:Fallback>
+  </mc:AlternateContent>
 </p:sld>
 </file>
 
-<file path=ppt/slides/slide12.xml><?xml version="1.0" encoding="utf-8"?>
+<file path=ppt/slides/slide13.xml><?xml version="1.0" encoding="utf-8"?>
 <p:sld xmlns:a="http://schemas.openxmlformats.org/drawingml/2006/main" xmlns:r="http://schemas.openxmlformats.org/officeDocument/2006/relationships" xmlns:p="http://schemas.openxmlformats.org/presentationml/2006/main">
   <p:cSld>
     <p:spTree>
@@ -26182,7 +26442,7 @@
             <a:fld id="{C263D6C4-4840-40CC-AC84-17E24B3B7BDE}" type="slidenum">
               <a:rPr lang="en-US" smtClean="0"/>
               <a:pPr/>
-              <a:t>12</a:t>
+              <a:t>13</a:t>
             </a:fld>
             <a:endParaRPr lang="en-US"/>
           </a:p>
@@ -26243,7 +26503,7 @@
 </p:sld>
 </file>
 
-<file path=ppt/slides/slide13.xml><?xml version="1.0" encoding="utf-8"?>
+<file path=ppt/slides/slide14.xml><?xml version="1.0" encoding="utf-8"?>
 <p:sld xmlns:a="http://schemas.openxmlformats.org/drawingml/2006/main" xmlns:r="http://schemas.openxmlformats.org/officeDocument/2006/relationships" xmlns:p="http://schemas.openxmlformats.org/presentationml/2006/main">
   <p:cSld>
     <p:spTree>
@@ -26356,7 +26616,7 @@
             <a:fld id="{C263D6C4-4840-40CC-AC84-17E24B3B7BDE}" type="slidenum">
               <a:rPr lang="en-US" smtClean="0"/>
               <a:pPr/>
-              <a:t>13</a:t>
+              <a:t>14</a:t>
             </a:fld>
             <a:endParaRPr lang="en-US"/>
           </a:p>
@@ -26387,7 +26647,7 @@
 </p:sld>
 </file>
 
-<file path=ppt/slides/slide14.xml><?xml version="1.0" encoding="utf-8"?>
+<file path=ppt/slides/slide15.xml><?xml version="1.0" encoding="utf-8"?>
 <p:sld xmlns:a="http://schemas.openxmlformats.org/drawingml/2006/main" xmlns:r="http://schemas.openxmlformats.org/officeDocument/2006/relationships" xmlns:p="http://schemas.openxmlformats.org/presentationml/2006/main">
   <p:cSld>
     <p:spTree>
@@ -26457,7 +26717,7 @@
             <a:fld id="{C263D6C4-4840-40CC-AC84-17E24B3B7BDE}" type="slidenum">
               <a:rPr lang="en-US" noProof="0" smtClean="0"/>
               <a:pPr/>
-              <a:t>14</a:t>
+              <a:t>15</a:t>
             </a:fld>
             <a:endParaRPr lang="en-US" noProof="0"/>
           </a:p>
@@ -26578,7 +26838,7 @@
 </p:sld>
 </file>
 
-<file path=ppt/slides/slide15.xml><?xml version="1.0" encoding="utf-8"?>
+<file path=ppt/slides/slide16.xml><?xml version="1.0" encoding="utf-8"?>
 <p:sld xmlns:a="http://schemas.openxmlformats.org/drawingml/2006/main" xmlns:r="http://schemas.openxmlformats.org/officeDocument/2006/relationships" xmlns:p="http://schemas.openxmlformats.org/presentationml/2006/main">
   <p:cSld>
     <p:spTree>
@@ -26654,7 +26914,7 @@
             <a:fld id="{C263D6C4-4840-40CC-AC84-17E24B3B7BDE}" type="slidenum">
               <a:rPr lang="en-US" smtClean="0"/>
               <a:pPr/>
-              <a:t>15</a:t>
+              <a:t>16</a:t>
             </a:fld>
             <a:endParaRPr lang="en-US"/>
           </a:p>
@@ -26734,7 +26994,7 @@
 </p:sld>
 </file>
 
-<file path=ppt/slides/slide16.xml><?xml version="1.0" encoding="utf-8"?>
+<file path=ppt/slides/slide17.xml><?xml version="1.0" encoding="utf-8"?>
 <p:sld xmlns:a="http://schemas.openxmlformats.org/drawingml/2006/main" xmlns:r="http://schemas.openxmlformats.org/officeDocument/2006/relationships" xmlns:p="http://schemas.openxmlformats.org/presentationml/2006/main">
   <p:cSld>
     <p:spTree>
@@ -27009,6 +27269,18 @@
   <p:clrMapOvr>
     <a:masterClrMapping/>
   </p:clrMapOvr>
+  <mc:AlternateContent xmlns:mc="http://schemas.openxmlformats.org/markup-compatibility/2006">
+    <mc:Choice xmlns:p14="http://schemas.microsoft.com/office/powerpoint/2010/main" Requires="p14">
+      <p:transition spd="med" p14:dur="700">
+        <p:fade/>
+      </p:transition>
+    </mc:Choice>
+    <mc:Fallback>
+      <p:transition spd="med">
+        <p:fade/>
+      </p:transition>
+    </mc:Fallback>
+  </mc:AlternateContent>
 </p:sld>
 </file>
 
@@ -27548,6 +27820,18 @@
   <p:clrMapOvr>
     <a:masterClrMapping/>
   </p:clrMapOvr>
+  <mc:AlternateContent xmlns:mc="http://schemas.openxmlformats.org/markup-compatibility/2006">
+    <mc:Choice xmlns:p14="http://schemas.microsoft.com/office/powerpoint/2010/main" Requires="p14">
+      <p:transition spd="med" p14:dur="700">
+        <p:fade/>
+      </p:transition>
+    </mc:Choice>
+    <mc:Fallback>
+      <p:transition spd="med">
+        <p:fade/>
+      </p:transition>
+    </mc:Fallback>
+  </mc:AlternateContent>
 </p:sld>
 </file>
 
@@ -28174,6 +28458,18 @@
   <p:clrMapOvr>
     <a:masterClrMapping/>
   </p:clrMapOvr>
+  <mc:AlternateContent xmlns:mc="http://schemas.openxmlformats.org/markup-compatibility/2006">
+    <mc:Choice xmlns:p14="http://schemas.microsoft.com/office/powerpoint/2010/main" Requires="p14">
+      <p:transition spd="med" p14:dur="700">
+        <p:fade/>
+      </p:transition>
+    </mc:Choice>
+    <mc:Fallback>
+      <p:transition spd="med">
+        <p:fade/>
+      </p:transition>
+    </mc:Fallback>
+  </mc:AlternateContent>
 </p:sld>
 </file>
 
@@ -28830,10 +29126,10 @@
       </p:grpSpPr>
       <p:sp>
         <p:nvSpPr>
-          <p:cNvPr id="7" name="Title 6">
+          <p:cNvPr id="2" name="Title 1">
             <a:extLst>
               <a:ext uri="{FF2B5EF4-FFF2-40B4-BE49-F238E27FC236}">
-                <a16:creationId xmlns:a16="http://schemas.microsoft.com/office/drawing/2014/main" id="{7875C19A-1AAE-476A-A316-A2CF92D763D3}"/>
+                <a16:creationId xmlns:a16="http://schemas.microsoft.com/office/drawing/2014/main" id="{4C2C61F4-2966-4DA3-8F23-B3B8A9143664}"/>
               </a:ext>
             </a:extLst>
           </p:cNvPr>
@@ -28844,112 +29140,25 @@
             <p:ph type="title"/>
           </p:nvPr>
         </p:nvSpPr>
-        <p:spPr>
-          <a:xfrm>
-            <a:off x="444500" y="542925"/>
-            <a:ext cx="11214100" cy="646331"/>
-          </a:xfrm>
-        </p:spPr>
+        <p:spPr/>
         <p:txBody>
           <a:bodyPr/>
           <a:lstStyle/>
           <a:p>
             <a:r>
-              <a:rPr lang="en-US" sz="4000"/>
-              <a:t>Prednosti tehnologije 3D printanja:</a:t>
+              <a:rPr lang="en-US"/>
+              <a:t>Primjene 3D printanja</a:t>
             </a:r>
+            <a:endParaRPr lang="bs-Latn-BA"/>
           </a:p>
         </p:txBody>
       </p:sp>
       <p:sp>
         <p:nvSpPr>
-          <p:cNvPr id="10" name="Text Placeholder 9">
+          <p:cNvPr id="3" name="Slide Number Placeholder 2">
             <a:extLst>
               <a:ext uri="{FF2B5EF4-FFF2-40B4-BE49-F238E27FC236}">
-                <a16:creationId xmlns:a16="http://schemas.microsoft.com/office/drawing/2014/main" id="{EF2BC084-E6DB-4DE7-B309-042A85EBA700}"/>
-              </a:ext>
-            </a:extLst>
-          </p:cNvPr>
-          <p:cNvSpPr>
-            <a:spLocks noGrp="1"/>
-          </p:cNvSpPr>
-          <p:nvPr>
-            <p:ph type="body" sz="quarter" idx="13"/>
-          </p:nvPr>
-        </p:nvSpPr>
-        <p:spPr>
-          <a:xfrm>
-            <a:off x="828812" y="1526968"/>
-            <a:ext cx="4445552" cy="4788107"/>
-          </a:xfrm>
-        </p:spPr>
-        <p:txBody>
-          <a:bodyPr/>
-          <a:lstStyle/>
-          <a:p>
-            <a:r>
-              <a:rPr lang="en-US" sz="2400">
-                <a:latin typeface="Bahnschrift" panose="020B0502040204020203" pitchFamily="34" charset="0"/>
-              </a:rPr>
-              <a:t>Fleksibilan dizajn modela</a:t>
-            </a:r>
-          </a:p>
-          <a:p>
-            <a:r>
-              <a:rPr lang="en-US" sz="2400">
-                <a:latin typeface="Bahnschrift" panose="020B0502040204020203" pitchFamily="34" charset="0"/>
-              </a:rPr>
-              <a:t>Brzo prototipiranje</a:t>
-            </a:r>
-          </a:p>
-          <a:p>
-            <a:r>
-              <a:rPr lang="en-US" sz="2400">
-                <a:latin typeface="Bahnschrift" panose="020B0502040204020203" pitchFamily="34" charset="0"/>
-              </a:rPr>
-              <a:t>Proizvodnja po potrebi</a:t>
-            </a:r>
-          </a:p>
-          <a:p>
-            <a:r>
-              <a:rPr lang="en-US" sz="2400">
-                <a:latin typeface="Bahnschrift" panose="020B0502040204020203" pitchFamily="34" charset="0"/>
-              </a:rPr>
-              <a:t>Različiti materijali</a:t>
-            </a:r>
-          </a:p>
-          <a:p>
-            <a:r>
-              <a:rPr lang="en-US" sz="2400">
-                <a:latin typeface="Bahnschrift" panose="020B0502040204020203" pitchFamily="34" charset="0"/>
-              </a:rPr>
-              <a:t>Efikasna proizvodnja</a:t>
-            </a:r>
-          </a:p>
-          <a:p>
-            <a:r>
-              <a:rPr lang="en-US" sz="2400">
-                <a:latin typeface="Bahnschrift" panose="020B0502040204020203" pitchFamily="34" charset="0"/>
-              </a:rPr>
-              <a:t>Relativno niska cijena</a:t>
-            </a:r>
-          </a:p>
-          <a:p>
-            <a:r>
-              <a:rPr lang="en-US" sz="2400">
-                <a:latin typeface="Bahnschrift" panose="020B0502040204020203" pitchFamily="34" charset="0"/>
-              </a:rPr>
-              <a:t>Pristupačnost</a:t>
-            </a:r>
-          </a:p>
-        </p:txBody>
-      </p:sp>
-      <p:sp>
-        <p:nvSpPr>
-          <p:cNvPr id="2" name="Slide Number Placeholder 1">
-            <a:extLst>
-              <a:ext uri="{FF2B5EF4-FFF2-40B4-BE49-F238E27FC236}">
-                <a16:creationId xmlns:a16="http://schemas.microsoft.com/office/drawing/2014/main" id="{BE9800F6-D571-48C4-8466-12AA1ADB6599}"/>
+                <a16:creationId xmlns:a16="http://schemas.microsoft.com/office/drawing/2014/main" id="{18791F02-E91F-4C27-8F51-5C2D9F71E604}"/>
               </a:ext>
             </a:extLst>
           </p:cNvPr>
@@ -28966,20 +29175,194 @@
           <a:lstStyle/>
           <a:p>
             <a:fld id="{C263D6C4-4840-40CC-AC84-17E24B3B7BDE}" type="slidenum">
-              <a:rPr lang="en-US" smtClean="0"/>
+              <a:rPr lang="en-US" noProof="0" smtClean="0"/>
               <a:pPr/>
               <a:t>9</a:t>
             </a:fld>
-            <a:endParaRPr lang="en-US"/>
+            <a:endParaRPr lang="en-US" noProof="0"/>
+          </a:p>
+        </p:txBody>
+      </p:sp>
+      <p:sp>
+        <p:nvSpPr>
+          <p:cNvPr id="4" name="Content Placeholder 3">
+            <a:extLst>
+              <a:ext uri="{FF2B5EF4-FFF2-40B4-BE49-F238E27FC236}">
+                <a16:creationId xmlns:a16="http://schemas.microsoft.com/office/drawing/2014/main" id="{BF61712E-A1D8-4115-AF31-122326307AFE}"/>
+              </a:ext>
+            </a:extLst>
+          </p:cNvPr>
+          <p:cNvSpPr>
+            <a:spLocks noGrp="1"/>
+          </p:cNvSpPr>
+          <p:nvPr>
+            <p:ph sz="half" idx="1"/>
+          </p:nvPr>
+        </p:nvSpPr>
+        <p:spPr/>
+        <p:txBody>
+          <a:bodyPr>
+            <a:normAutofit/>
+          </a:bodyPr>
+          <a:lstStyle/>
+          <a:p>
+            <a:r>
+              <a:rPr lang="en-US" sz="2800">
+                <a:latin typeface="+mj-lt"/>
+              </a:rPr>
+              <a:t>Igračke</a:t>
+            </a:r>
+          </a:p>
+          <a:p>
+            <a:r>
+              <a:rPr lang="en-US" sz="2800">
+                <a:latin typeface="+mj-lt"/>
+              </a:rPr>
+              <a:t>Funkcionalni dijelovi</a:t>
+            </a:r>
+          </a:p>
+          <a:p>
+            <a:r>
+              <a:rPr lang="en-US" sz="2800">
+                <a:latin typeface="+mj-lt"/>
+              </a:rPr>
+              <a:t>Mašine</a:t>
+            </a:r>
+          </a:p>
+          <a:p>
+            <a:r>
+              <a:rPr lang="en-US" sz="2800">
+                <a:latin typeface="+mj-lt"/>
+              </a:rPr>
+              <a:t>Prostetika</a:t>
+            </a:r>
+          </a:p>
+          <a:p>
+            <a:r>
+              <a:rPr lang="en-US" sz="2800">
+                <a:latin typeface="+mj-lt"/>
+              </a:rPr>
+              <a:t>Kuće</a:t>
+            </a:r>
+          </a:p>
+          <a:p>
+            <a:r>
+              <a:rPr lang="en-US" sz="2800">
+                <a:latin typeface="+mj-lt"/>
+              </a:rPr>
+              <a:t>Organi</a:t>
+            </a:r>
+          </a:p>
+          <a:p>
+            <a:pPr marL="0" indent="0">
+              <a:buNone/>
+            </a:pPr>
+            <a:r>
+              <a:rPr lang="en-US" sz="2800">
+                <a:latin typeface="+mj-lt"/>
+              </a:rPr>
+              <a:t>...</a:t>
+            </a:r>
+            <a:endParaRPr lang="bs-Latn-BA" sz="2800">
+              <a:latin typeface="+mj-lt"/>
+            </a:endParaRPr>
           </a:p>
         </p:txBody>
       </p:sp>
       <p:pic>
         <p:nvPicPr>
-          <p:cNvPr id="4" name="Picture 3">
+          <p:cNvPr id="9" name="Content Placeholder 8">
             <a:extLst>
               <a:ext uri="{FF2B5EF4-FFF2-40B4-BE49-F238E27FC236}">
-                <a16:creationId xmlns:a16="http://schemas.microsoft.com/office/drawing/2014/main" id="{D8298E14-2DD4-4BE9-850D-FBD62CDE77E6}"/>
+                <a16:creationId xmlns:a16="http://schemas.microsoft.com/office/drawing/2014/main" id="{06BDC1E6-C562-4311-BC4F-D4D62F0EA3AA}"/>
+              </a:ext>
+            </a:extLst>
+          </p:cNvPr>
+          <p:cNvPicPr>
+            <a:picLocks noGrp="1" noChangeAspect="1"/>
+          </p:cNvPicPr>
+          <p:nvPr>
+            <p:ph sz="half" idx="2"/>
+          </p:nvPr>
+        </p:nvPicPr>
+        <p:blipFill rotWithShape="1">
+          <a:blip r:embed="rId2"/>
+          <a:srcRect r="34698"/>
+          <a:stretch/>
+        </p:blipFill>
+        <p:spPr>
+          <a:xfrm>
+            <a:off x="6109449" y="1444260"/>
+            <a:ext cx="5411758" cy="4659248"/>
+          </a:xfrm>
+        </p:spPr>
+      </p:pic>
+      <p:pic>
+        <p:nvPicPr>
+          <p:cNvPr id="11" name="Picture 10">
+            <a:extLst>
+              <a:ext uri="{FF2B5EF4-FFF2-40B4-BE49-F238E27FC236}">
+                <a16:creationId xmlns:a16="http://schemas.microsoft.com/office/drawing/2014/main" id="{EC75EB6B-8F74-45E3-B3A6-E65D5CACFA4B}"/>
+              </a:ext>
+            </a:extLst>
+          </p:cNvPr>
+          <p:cNvPicPr>
+            <a:picLocks noChangeAspect="1"/>
+          </p:cNvPicPr>
+          <p:nvPr/>
+        </p:nvPicPr>
+        <p:blipFill>
+          <a:blip r:embed="rId3"/>
+          <a:stretch>
+            <a:fillRect/>
+          </a:stretch>
+        </p:blipFill>
+        <p:spPr>
+          <a:xfrm>
+            <a:off x="5439433" y="1419236"/>
+            <a:ext cx="6309202" cy="4731902"/>
+          </a:xfrm>
+          <a:prstGeom prst="rect">
+            <a:avLst/>
+          </a:prstGeom>
+        </p:spPr>
+      </p:pic>
+      <p:pic>
+        <p:nvPicPr>
+          <p:cNvPr id="15" name="Picture 14">
+            <a:extLst>
+              <a:ext uri="{FF2B5EF4-FFF2-40B4-BE49-F238E27FC236}">
+                <a16:creationId xmlns:a16="http://schemas.microsoft.com/office/drawing/2014/main" id="{DD55D9F9-4F3A-45CE-A940-49DA0E9E0432}"/>
+              </a:ext>
+            </a:extLst>
+          </p:cNvPr>
+          <p:cNvPicPr>
+            <a:picLocks noChangeAspect="1"/>
+          </p:cNvPicPr>
+          <p:nvPr/>
+        </p:nvPicPr>
+        <p:blipFill>
+          <a:blip r:embed="rId4"/>
+          <a:stretch>
+            <a:fillRect/>
+          </a:stretch>
+        </p:blipFill>
+        <p:spPr>
+          <a:xfrm>
+            <a:off x="5344288" y="1419470"/>
+            <a:ext cx="6499491" cy="4750866"/>
+          </a:xfrm>
+          <a:prstGeom prst="rect">
+            <a:avLst/>
+          </a:prstGeom>
+        </p:spPr>
+      </p:pic>
+      <p:pic>
+        <p:nvPicPr>
+          <p:cNvPr id="17" name="Picture 16">
+            <a:extLst>
+              <a:ext uri="{FF2B5EF4-FFF2-40B4-BE49-F238E27FC236}">
+                <a16:creationId xmlns:a16="http://schemas.microsoft.com/office/drawing/2014/main" id="{C6398E55-393D-4DD8-9AC8-D01CC1944864}"/>
               </a:ext>
             </a:extLst>
           </p:cNvPr>
@@ -28989,72 +29372,848 @@
           <p:nvPr/>
         </p:nvPicPr>
         <p:blipFill rotWithShape="1">
-          <a:blip r:embed="rId2"/>
-          <a:srcRect l="24298" b="5789"/>
+          <a:blip r:embed="rId5"/>
+          <a:srcRect l="5549" r="5158"/>
           <a:stretch/>
         </p:blipFill>
         <p:spPr>
           <a:xfrm>
-            <a:off x="6096000" y="1568464"/>
-            <a:ext cx="4991147" cy="4012619"/>
+            <a:off x="4933803" y="1373393"/>
+            <a:ext cx="7055748" cy="4761263"/>
           </a:xfrm>
           <a:prstGeom prst="rect">
             <a:avLst/>
           </a:prstGeom>
-          <a:solidFill>
-            <a:srgbClr val="FFFFFF">
-              <a:shade val="85000"/>
-            </a:srgbClr>
-          </a:solidFill>
-          <a:ln w="88900" cap="sq">
-            <a:solidFill>
-              <a:srgbClr val="FFFFFF"/>
-            </a:solidFill>
-            <a:miter lim="800000"/>
-          </a:ln>
-          <a:effectLst>
-            <a:outerShdw blurRad="55000" dist="18000" dir="5400000" algn="tl" rotWithShape="0">
-              <a:srgbClr val="000000">
-                <a:alpha val="40000"/>
-              </a:srgbClr>
-            </a:outerShdw>
-          </a:effectLst>
-          <a:scene3d>
-            <a:camera prst="orthographicFront"/>
-            <a:lightRig rig="twoPt" dir="t">
-              <a:rot lat="0" lon="0" rev="7200000"/>
-            </a:lightRig>
-          </a:scene3d>
-          <a:sp3d>
-            <a:bevelT w="25400" h="19050"/>
-            <a:contourClr>
-              <a:srgbClr val="FFFFFF"/>
-            </a:contourClr>
-          </a:sp3d>
         </p:spPr>
       </p:pic>
+      <p:pic>
+        <p:nvPicPr>
+          <p:cNvPr id="19" name="Picture 18">
+            <a:extLst>
+              <a:ext uri="{FF2B5EF4-FFF2-40B4-BE49-F238E27FC236}">
+                <a16:creationId xmlns:a16="http://schemas.microsoft.com/office/drawing/2014/main" id="{8156F52B-16BC-4A50-B56D-6616DA16C56B}"/>
+              </a:ext>
+            </a:extLst>
+          </p:cNvPr>
+          <p:cNvPicPr>
+            <a:picLocks noChangeAspect="1"/>
+          </p:cNvPicPr>
+          <p:nvPr/>
+        </p:nvPicPr>
+        <p:blipFill rotWithShape="1">
+          <a:blip r:embed="rId6"/>
+          <a:srcRect l="3046" r="14464"/>
+          <a:stretch/>
+        </p:blipFill>
+        <p:spPr>
+          <a:xfrm>
+            <a:off x="4947055" y="1356402"/>
+            <a:ext cx="7055748" cy="4819650"/>
+          </a:xfrm>
+          <a:prstGeom prst="rect">
+            <a:avLst/>
+          </a:prstGeom>
+        </p:spPr>
+      </p:pic>
+      <p:pic>
+        <p:nvPicPr>
+          <p:cNvPr id="21" name="Picture 20">
+            <a:extLst>
+              <a:ext uri="{FF2B5EF4-FFF2-40B4-BE49-F238E27FC236}">
+                <a16:creationId xmlns:a16="http://schemas.microsoft.com/office/drawing/2014/main" id="{F55B71F4-E6B1-43E4-83ED-D98E2B81E5FD}"/>
+              </a:ext>
+            </a:extLst>
+          </p:cNvPr>
+          <p:cNvPicPr>
+            <a:picLocks noChangeAspect="1"/>
+          </p:cNvPicPr>
+          <p:nvPr/>
+        </p:nvPicPr>
+        <p:blipFill rotWithShape="1">
+          <a:blip r:embed="rId7"/>
+          <a:srcRect l="4954" t="55" r="7897" b="-55"/>
+          <a:stretch/>
+        </p:blipFill>
+        <p:spPr>
+          <a:xfrm>
+            <a:off x="4947053" y="1361028"/>
+            <a:ext cx="7055749" cy="4819650"/>
+          </a:xfrm>
+          <a:prstGeom prst="rect">
+            <a:avLst/>
+          </a:prstGeom>
+        </p:spPr>
+      </p:pic>
+      <p:pic>
+        <p:nvPicPr>
+          <p:cNvPr id="23" name="Picture 22">
+            <a:extLst>
+              <a:ext uri="{FF2B5EF4-FFF2-40B4-BE49-F238E27FC236}">
+                <a16:creationId xmlns:a16="http://schemas.microsoft.com/office/drawing/2014/main" id="{8DB5466E-651A-4481-805B-E1D5DFDAAA12}"/>
+              </a:ext>
+            </a:extLst>
+          </p:cNvPr>
+          <p:cNvPicPr>
+            <a:picLocks noChangeAspect="1"/>
+          </p:cNvPicPr>
+          <p:nvPr/>
+        </p:nvPicPr>
+        <p:blipFill rotWithShape="1">
+          <a:blip r:embed="rId8"/>
+          <a:srcRect l="4539" t="180" r="10580" b="-180"/>
+          <a:stretch/>
+        </p:blipFill>
+        <p:spPr>
+          <a:xfrm>
+            <a:off x="4691268" y="1345025"/>
+            <a:ext cx="7311534" cy="4845326"/>
+          </a:xfrm>
+          <a:prstGeom prst="rect">
+            <a:avLst/>
+          </a:prstGeom>
+        </p:spPr>
+      </p:pic>
+      <p:pic>
+        <p:nvPicPr>
+          <p:cNvPr id="25" name="Picture 24">
+            <a:extLst>
+              <a:ext uri="{FF2B5EF4-FFF2-40B4-BE49-F238E27FC236}">
+                <a16:creationId xmlns:a16="http://schemas.microsoft.com/office/drawing/2014/main" id="{2B61198D-5867-4191-AA04-031A3B02E674}"/>
+              </a:ext>
+            </a:extLst>
+          </p:cNvPr>
+          <p:cNvPicPr>
+            <a:picLocks noChangeAspect="1"/>
+          </p:cNvPicPr>
+          <p:nvPr/>
+        </p:nvPicPr>
+        <p:blipFill rotWithShape="1">
+          <a:blip r:embed="rId9"/>
+          <a:srcRect l="529" t="3057" r="2334" b="10675"/>
+          <a:stretch/>
+        </p:blipFill>
+        <p:spPr>
+          <a:xfrm>
+            <a:off x="4646990" y="1330726"/>
+            <a:ext cx="7369063" cy="4874615"/>
+          </a:xfrm>
+          <a:prstGeom prst="rect">
+            <a:avLst/>
+          </a:prstGeom>
+        </p:spPr>
+      </p:pic>
+      <p:sp>
+        <p:nvSpPr>
+          <p:cNvPr id="26" name="TextBox 25">
+            <a:extLst>
+              <a:ext uri="{FF2B5EF4-FFF2-40B4-BE49-F238E27FC236}">
+                <a16:creationId xmlns:a16="http://schemas.microsoft.com/office/drawing/2014/main" id="{879B52DA-57AC-433E-99FA-37970DA72659}"/>
+              </a:ext>
+            </a:extLst>
+          </p:cNvPr>
+          <p:cNvSpPr txBox="1"/>
+          <p:nvPr/>
+        </p:nvSpPr>
+        <p:spPr>
+          <a:xfrm>
+            <a:off x="1046807" y="4903179"/>
+            <a:ext cx="3659330" cy="1200329"/>
+          </a:xfrm>
+          <a:prstGeom prst="rect">
+            <a:avLst/>
+          </a:prstGeom>
+          <a:noFill/>
+        </p:spPr>
+        <p:txBody>
+          <a:bodyPr wrap="square" rtlCol="0">
+            <a:spAutoFit/>
+          </a:bodyPr>
+          <a:lstStyle/>
+          <a:p>
+            <a:r>
+              <a:rPr lang="en-US" sz="3600">
+                <a:solidFill>
+                  <a:schemeClr val="bg1"/>
+                </a:solidFill>
+                <a:latin typeface="+mj-lt"/>
+              </a:rPr>
+              <a:t>SAMO NEBO JE GRANICA</a:t>
+            </a:r>
+            <a:endParaRPr lang="bs-Latn-BA" sz="3600">
+              <a:solidFill>
+                <a:schemeClr val="bg1"/>
+              </a:solidFill>
+              <a:latin typeface="+mj-lt"/>
+            </a:endParaRPr>
+          </a:p>
+        </p:txBody>
+      </p:sp>
     </p:spTree>
     <p:extLst>
       <p:ext uri="{BB962C8B-B14F-4D97-AF65-F5344CB8AC3E}">
-        <p14:creationId xmlns:p14="http://schemas.microsoft.com/office/powerpoint/2010/main" val="741791448"/>
+        <p14:creationId xmlns:p14="http://schemas.microsoft.com/office/powerpoint/2010/main" val="734535907"/>
       </p:ext>
     </p:extLst>
   </p:cSld>
   <p:clrMapOvr>
     <a:masterClrMapping/>
   </p:clrMapOvr>
-  <mc:AlternateContent xmlns:mc="http://schemas.openxmlformats.org/markup-compatibility/2006" xmlns:p14="http://schemas.microsoft.com/office/powerpoint/2010/main">
-    <mc:Choice Requires="p14">
-      <p:transition spd="med" p14:dur="700">
-        <p:fade/>
-      </p:transition>
-    </mc:Choice>
-    <mc:Fallback xmlns="">
-      <p:transition spd="med">
-        <p:fade/>
-      </p:transition>
-    </mc:Fallback>
-  </mc:AlternateContent>
+  <p:timing>
+    <p:tnLst>
+      <p:par>
+        <p:cTn id="1" dur="indefinite" restart="never" nodeType="tmRoot">
+          <p:childTnLst>
+            <p:seq concurrent="1" nextAc="seek">
+              <p:cTn id="2" dur="indefinite" nodeType="mainSeq">
+                <p:childTnLst>
+                  <p:par>
+                    <p:cTn id="3" fill="hold">
+                      <p:stCondLst>
+                        <p:cond delay="indefinite"/>
+                      </p:stCondLst>
+                      <p:childTnLst>
+                        <p:par>
+                          <p:cTn id="4" fill="hold">
+                            <p:stCondLst>
+                              <p:cond delay="0"/>
+                            </p:stCondLst>
+                            <p:childTnLst>
+                              <p:par>
+                                <p:cTn id="5" presetID="1" presetClass="entr" presetSubtype="0" fill="hold" grpId="0" nodeType="clickEffect">
+                                  <p:stCondLst>
+                                    <p:cond delay="0"/>
+                                  </p:stCondLst>
+                                  <p:childTnLst>
+                                    <p:set>
+                                      <p:cBhvr>
+                                        <p:cTn id="6" dur="1" fill="hold">
+                                          <p:stCondLst>
+                                            <p:cond delay="0"/>
+                                          </p:stCondLst>
+                                        </p:cTn>
+                                        <p:tgtEl>
+                                          <p:spTgt spid="4">
+                                            <p:txEl>
+                                              <p:pRg st="0" end="0"/>
+                                            </p:txEl>
+                                          </p:spTgt>
+                                        </p:tgtEl>
+                                        <p:attrNameLst>
+                                          <p:attrName>style.visibility</p:attrName>
+                                        </p:attrNameLst>
+                                      </p:cBhvr>
+                                      <p:to>
+                                        <p:strVal val="visible"/>
+                                      </p:to>
+                                    </p:set>
+                                  </p:childTnLst>
+                                </p:cTn>
+                              </p:par>
+                              <p:par>
+                                <p:cTn id="7" presetID="1" presetClass="entr" presetSubtype="0" fill="hold" nodeType="withEffect">
+                                  <p:stCondLst>
+                                    <p:cond delay="0"/>
+                                  </p:stCondLst>
+                                  <p:childTnLst>
+                                    <p:set>
+                                      <p:cBhvr>
+                                        <p:cTn id="8" dur="1" fill="hold">
+                                          <p:stCondLst>
+                                            <p:cond delay="0"/>
+                                          </p:stCondLst>
+                                        </p:cTn>
+                                        <p:tgtEl>
+                                          <p:spTgt spid="9"/>
+                                        </p:tgtEl>
+                                        <p:attrNameLst>
+                                          <p:attrName>style.visibility</p:attrName>
+                                        </p:attrNameLst>
+                                      </p:cBhvr>
+                                      <p:to>
+                                        <p:strVal val="visible"/>
+                                      </p:to>
+                                    </p:set>
+                                  </p:childTnLst>
+                                </p:cTn>
+                              </p:par>
+                            </p:childTnLst>
+                          </p:cTn>
+                        </p:par>
+                      </p:childTnLst>
+                    </p:cTn>
+                  </p:par>
+                  <p:par>
+                    <p:cTn id="9" fill="hold">
+                      <p:stCondLst>
+                        <p:cond delay="indefinite"/>
+                      </p:stCondLst>
+                      <p:childTnLst>
+                        <p:par>
+                          <p:cTn id="10" fill="hold">
+                            <p:stCondLst>
+                              <p:cond delay="0"/>
+                            </p:stCondLst>
+                            <p:childTnLst>
+                              <p:par>
+                                <p:cTn id="11" presetID="1" presetClass="entr" presetSubtype="0" fill="hold" grpId="0" nodeType="clickEffect">
+                                  <p:stCondLst>
+                                    <p:cond delay="0"/>
+                                  </p:stCondLst>
+                                  <p:childTnLst>
+                                    <p:set>
+                                      <p:cBhvr>
+                                        <p:cTn id="12" dur="1" fill="hold">
+                                          <p:stCondLst>
+                                            <p:cond delay="0"/>
+                                          </p:stCondLst>
+                                        </p:cTn>
+                                        <p:tgtEl>
+                                          <p:spTgt spid="4">
+                                            <p:txEl>
+                                              <p:pRg st="1" end="1"/>
+                                            </p:txEl>
+                                          </p:spTgt>
+                                        </p:tgtEl>
+                                        <p:attrNameLst>
+                                          <p:attrName>style.visibility</p:attrName>
+                                        </p:attrNameLst>
+                                      </p:cBhvr>
+                                      <p:to>
+                                        <p:strVal val="visible"/>
+                                      </p:to>
+                                    </p:set>
+                                  </p:childTnLst>
+                                </p:cTn>
+                              </p:par>
+                              <p:par>
+                                <p:cTn id="13" presetID="1" presetClass="entr" presetSubtype="0" fill="hold" nodeType="withEffect">
+                                  <p:stCondLst>
+                                    <p:cond delay="0"/>
+                                  </p:stCondLst>
+                                  <p:childTnLst>
+                                    <p:set>
+                                      <p:cBhvr>
+                                        <p:cTn id="14" dur="1" fill="hold">
+                                          <p:stCondLst>
+                                            <p:cond delay="0"/>
+                                          </p:stCondLst>
+                                        </p:cTn>
+                                        <p:tgtEl>
+                                          <p:spTgt spid="11"/>
+                                        </p:tgtEl>
+                                        <p:attrNameLst>
+                                          <p:attrName>style.visibility</p:attrName>
+                                        </p:attrNameLst>
+                                      </p:cBhvr>
+                                      <p:to>
+                                        <p:strVal val="visible"/>
+                                      </p:to>
+                                    </p:set>
+                                  </p:childTnLst>
+                                </p:cTn>
+                              </p:par>
+                            </p:childTnLst>
+                          </p:cTn>
+                        </p:par>
+                      </p:childTnLst>
+                    </p:cTn>
+                  </p:par>
+                  <p:par>
+                    <p:cTn id="15" fill="hold">
+                      <p:stCondLst>
+                        <p:cond delay="indefinite"/>
+                      </p:stCondLst>
+                      <p:childTnLst>
+                        <p:par>
+                          <p:cTn id="16" fill="hold">
+                            <p:stCondLst>
+                              <p:cond delay="0"/>
+                            </p:stCondLst>
+                            <p:childTnLst>
+                              <p:par>
+                                <p:cTn id="17" presetID="1" presetClass="entr" presetSubtype="0" fill="hold" grpId="0" nodeType="clickEffect">
+                                  <p:stCondLst>
+                                    <p:cond delay="0"/>
+                                  </p:stCondLst>
+                                  <p:childTnLst>
+                                    <p:set>
+                                      <p:cBhvr>
+                                        <p:cTn id="18" dur="1" fill="hold">
+                                          <p:stCondLst>
+                                            <p:cond delay="0"/>
+                                          </p:stCondLst>
+                                        </p:cTn>
+                                        <p:tgtEl>
+                                          <p:spTgt spid="4">
+                                            <p:txEl>
+                                              <p:pRg st="2" end="2"/>
+                                            </p:txEl>
+                                          </p:spTgt>
+                                        </p:tgtEl>
+                                        <p:attrNameLst>
+                                          <p:attrName>style.visibility</p:attrName>
+                                        </p:attrNameLst>
+                                      </p:cBhvr>
+                                      <p:to>
+                                        <p:strVal val="visible"/>
+                                      </p:to>
+                                    </p:set>
+                                  </p:childTnLst>
+                                </p:cTn>
+                              </p:par>
+                              <p:par>
+                                <p:cTn id="19" presetID="1" presetClass="entr" presetSubtype="0" fill="hold" nodeType="withEffect">
+                                  <p:stCondLst>
+                                    <p:cond delay="0"/>
+                                  </p:stCondLst>
+                                  <p:childTnLst>
+                                    <p:set>
+                                      <p:cBhvr>
+                                        <p:cTn id="20" dur="1" fill="hold">
+                                          <p:stCondLst>
+                                            <p:cond delay="0"/>
+                                          </p:stCondLst>
+                                        </p:cTn>
+                                        <p:tgtEl>
+                                          <p:spTgt spid="15"/>
+                                        </p:tgtEl>
+                                        <p:attrNameLst>
+                                          <p:attrName>style.visibility</p:attrName>
+                                        </p:attrNameLst>
+                                      </p:cBhvr>
+                                      <p:to>
+                                        <p:strVal val="visible"/>
+                                      </p:to>
+                                    </p:set>
+                                  </p:childTnLst>
+                                </p:cTn>
+                              </p:par>
+                            </p:childTnLst>
+                          </p:cTn>
+                        </p:par>
+                      </p:childTnLst>
+                    </p:cTn>
+                  </p:par>
+                  <p:par>
+                    <p:cTn id="21" fill="hold">
+                      <p:stCondLst>
+                        <p:cond delay="indefinite"/>
+                      </p:stCondLst>
+                      <p:childTnLst>
+                        <p:par>
+                          <p:cTn id="22" fill="hold">
+                            <p:stCondLst>
+                              <p:cond delay="0"/>
+                            </p:stCondLst>
+                            <p:childTnLst>
+                              <p:par>
+                                <p:cTn id="23" presetID="1" presetClass="entr" presetSubtype="0" fill="hold" nodeType="clickEffect">
+                                  <p:stCondLst>
+                                    <p:cond delay="0"/>
+                                  </p:stCondLst>
+                                  <p:childTnLst>
+                                    <p:set>
+                                      <p:cBhvr>
+                                        <p:cTn id="24" dur="1" fill="hold">
+                                          <p:stCondLst>
+                                            <p:cond delay="0"/>
+                                          </p:stCondLst>
+                                        </p:cTn>
+                                        <p:tgtEl>
+                                          <p:spTgt spid="17"/>
+                                        </p:tgtEl>
+                                        <p:attrNameLst>
+                                          <p:attrName>style.visibility</p:attrName>
+                                        </p:attrNameLst>
+                                      </p:cBhvr>
+                                      <p:to>
+                                        <p:strVal val="visible"/>
+                                      </p:to>
+                                    </p:set>
+                                  </p:childTnLst>
+                                </p:cTn>
+                              </p:par>
+                            </p:childTnLst>
+                          </p:cTn>
+                        </p:par>
+                      </p:childTnLst>
+                    </p:cTn>
+                  </p:par>
+                  <p:par>
+                    <p:cTn id="25" fill="hold">
+                      <p:stCondLst>
+                        <p:cond delay="indefinite"/>
+                      </p:stCondLst>
+                      <p:childTnLst>
+                        <p:par>
+                          <p:cTn id="26" fill="hold">
+                            <p:stCondLst>
+                              <p:cond delay="0"/>
+                            </p:stCondLst>
+                            <p:childTnLst>
+                              <p:par>
+                                <p:cTn id="27" presetID="1" presetClass="entr" presetSubtype="0" fill="hold" grpId="0" nodeType="clickEffect">
+                                  <p:stCondLst>
+                                    <p:cond delay="0"/>
+                                  </p:stCondLst>
+                                  <p:childTnLst>
+                                    <p:set>
+                                      <p:cBhvr>
+                                        <p:cTn id="28" dur="1" fill="hold">
+                                          <p:stCondLst>
+                                            <p:cond delay="0"/>
+                                          </p:stCondLst>
+                                        </p:cTn>
+                                        <p:tgtEl>
+                                          <p:spTgt spid="4">
+                                            <p:txEl>
+                                              <p:pRg st="3" end="3"/>
+                                            </p:txEl>
+                                          </p:spTgt>
+                                        </p:tgtEl>
+                                        <p:attrNameLst>
+                                          <p:attrName>style.visibility</p:attrName>
+                                        </p:attrNameLst>
+                                      </p:cBhvr>
+                                      <p:to>
+                                        <p:strVal val="visible"/>
+                                      </p:to>
+                                    </p:set>
+                                  </p:childTnLst>
+                                </p:cTn>
+                              </p:par>
+                              <p:par>
+                                <p:cTn id="29" presetID="1" presetClass="entr" presetSubtype="0" fill="hold" nodeType="withEffect">
+                                  <p:stCondLst>
+                                    <p:cond delay="0"/>
+                                  </p:stCondLst>
+                                  <p:childTnLst>
+                                    <p:set>
+                                      <p:cBhvr>
+                                        <p:cTn id="30" dur="1" fill="hold">
+                                          <p:stCondLst>
+                                            <p:cond delay="0"/>
+                                          </p:stCondLst>
+                                        </p:cTn>
+                                        <p:tgtEl>
+                                          <p:spTgt spid="19"/>
+                                        </p:tgtEl>
+                                        <p:attrNameLst>
+                                          <p:attrName>style.visibility</p:attrName>
+                                        </p:attrNameLst>
+                                      </p:cBhvr>
+                                      <p:to>
+                                        <p:strVal val="visible"/>
+                                      </p:to>
+                                    </p:set>
+                                  </p:childTnLst>
+                                </p:cTn>
+                              </p:par>
+                            </p:childTnLst>
+                          </p:cTn>
+                        </p:par>
+                      </p:childTnLst>
+                    </p:cTn>
+                  </p:par>
+                  <p:par>
+                    <p:cTn id="31" fill="hold">
+                      <p:stCondLst>
+                        <p:cond delay="indefinite"/>
+                      </p:stCondLst>
+                      <p:childTnLst>
+                        <p:par>
+                          <p:cTn id="32" fill="hold">
+                            <p:stCondLst>
+                              <p:cond delay="0"/>
+                            </p:stCondLst>
+                            <p:childTnLst>
+                              <p:par>
+                                <p:cTn id="33" presetID="1" presetClass="entr" presetSubtype="0" fill="hold" grpId="0" nodeType="clickEffect">
+                                  <p:stCondLst>
+                                    <p:cond delay="0"/>
+                                  </p:stCondLst>
+                                  <p:childTnLst>
+                                    <p:set>
+                                      <p:cBhvr>
+                                        <p:cTn id="34" dur="1" fill="hold">
+                                          <p:stCondLst>
+                                            <p:cond delay="0"/>
+                                          </p:stCondLst>
+                                        </p:cTn>
+                                        <p:tgtEl>
+                                          <p:spTgt spid="4">
+                                            <p:txEl>
+                                              <p:pRg st="4" end="4"/>
+                                            </p:txEl>
+                                          </p:spTgt>
+                                        </p:tgtEl>
+                                        <p:attrNameLst>
+                                          <p:attrName>style.visibility</p:attrName>
+                                        </p:attrNameLst>
+                                      </p:cBhvr>
+                                      <p:to>
+                                        <p:strVal val="visible"/>
+                                      </p:to>
+                                    </p:set>
+                                  </p:childTnLst>
+                                </p:cTn>
+                              </p:par>
+                              <p:par>
+                                <p:cTn id="35" presetID="1" presetClass="entr" presetSubtype="0" fill="hold" nodeType="withEffect">
+                                  <p:stCondLst>
+                                    <p:cond delay="0"/>
+                                  </p:stCondLst>
+                                  <p:childTnLst>
+                                    <p:set>
+                                      <p:cBhvr>
+                                        <p:cTn id="36" dur="1" fill="hold">
+                                          <p:stCondLst>
+                                            <p:cond delay="0"/>
+                                          </p:stCondLst>
+                                        </p:cTn>
+                                        <p:tgtEl>
+                                          <p:spTgt spid="21"/>
+                                        </p:tgtEl>
+                                        <p:attrNameLst>
+                                          <p:attrName>style.visibility</p:attrName>
+                                        </p:attrNameLst>
+                                      </p:cBhvr>
+                                      <p:to>
+                                        <p:strVal val="visible"/>
+                                      </p:to>
+                                    </p:set>
+                                  </p:childTnLst>
+                                </p:cTn>
+                              </p:par>
+                            </p:childTnLst>
+                          </p:cTn>
+                        </p:par>
+                      </p:childTnLst>
+                    </p:cTn>
+                  </p:par>
+                  <p:par>
+                    <p:cTn id="37" fill="hold">
+                      <p:stCondLst>
+                        <p:cond delay="indefinite"/>
+                      </p:stCondLst>
+                      <p:childTnLst>
+                        <p:par>
+                          <p:cTn id="38" fill="hold">
+                            <p:stCondLst>
+                              <p:cond delay="0"/>
+                            </p:stCondLst>
+                            <p:childTnLst>
+                              <p:par>
+                                <p:cTn id="39" presetID="1" presetClass="entr" presetSubtype="0" fill="hold" grpId="0" nodeType="clickEffect">
+                                  <p:stCondLst>
+                                    <p:cond delay="0"/>
+                                  </p:stCondLst>
+                                  <p:childTnLst>
+                                    <p:set>
+                                      <p:cBhvr>
+                                        <p:cTn id="40" dur="1" fill="hold">
+                                          <p:stCondLst>
+                                            <p:cond delay="0"/>
+                                          </p:stCondLst>
+                                        </p:cTn>
+                                        <p:tgtEl>
+                                          <p:spTgt spid="4">
+                                            <p:txEl>
+                                              <p:pRg st="5" end="5"/>
+                                            </p:txEl>
+                                          </p:spTgt>
+                                        </p:tgtEl>
+                                        <p:attrNameLst>
+                                          <p:attrName>style.visibility</p:attrName>
+                                        </p:attrNameLst>
+                                      </p:cBhvr>
+                                      <p:to>
+                                        <p:strVal val="visible"/>
+                                      </p:to>
+                                    </p:set>
+                                  </p:childTnLst>
+                                </p:cTn>
+                              </p:par>
+                              <p:par>
+                                <p:cTn id="41" presetID="1" presetClass="entr" presetSubtype="0" fill="hold" nodeType="withEffect">
+                                  <p:stCondLst>
+                                    <p:cond delay="0"/>
+                                  </p:stCondLst>
+                                  <p:childTnLst>
+                                    <p:set>
+                                      <p:cBhvr>
+                                        <p:cTn id="42" dur="1" fill="hold">
+                                          <p:stCondLst>
+                                            <p:cond delay="0"/>
+                                          </p:stCondLst>
+                                        </p:cTn>
+                                        <p:tgtEl>
+                                          <p:spTgt spid="23"/>
+                                        </p:tgtEl>
+                                        <p:attrNameLst>
+                                          <p:attrName>style.visibility</p:attrName>
+                                        </p:attrNameLst>
+                                      </p:cBhvr>
+                                      <p:to>
+                                        <p:strVal val="visible"/>
+                                      </p:to>
+                                    </p:set>
+                                  </p:childTnLst>
+                                </p:cTn>
+                              </p:par>
+                            </p:childTnLst>
+                          </p:cTn>
+                        </p:par>
+                      </p:childTnLst>
+                    </p:cTn>
+                  </p:par>
+                  <p:par>
+                    <p:cTn id="43" fill="hold">
+                      <p:stCondLst>
+                        <p:cond delay="indefinite"/>
+                      </p:stCondLst>
+                      <p:childTnLst>
+                        <p:par>
+                          <p:cTn id="44" fill="hold">
+                            <p:stCondLst>
+                              <p:cond delay="0"/>
+                            </p:stCondLst>
+                            <p:childTnLst>
+                              <p:par>
+                                <p:cTn id="45" presetID="1" presetClass="entr" presetSubtype="0" fill="hold" grpId="0" nodeType="clickEffect">
+                                  <p:stCondLst>
+                                    <p:cond delay="0"/>
+                                  </p:stCondLst>
+                                  <p:childTnLst>
+                                    <p:set>
+                                      <p:cBhvr>
+                                        <p:cTn id="46" dur="1" fill="hold">
+                                          <p:stCondLst>
+                                            <p:cond delay="0"/>
+                                          </p:stCondLst>
+                                        </p:cTn>
+                                        <p:tgtEl>
+                                          <p:spTgt spid="4">
+                                            <p:txEl>
+                                              <p:pRg st="6" end="6"/>
+                                            </p:txEl>
+                                          </p:spTgt>
+                                        </p:tgtEl>
+                                        <p:attrNameLst>
+                                          <p:attrName>style.visibility</p:attrName>
+                                        </p:attrNameLst>
+                                      </p:cBhvr>
+                                      <p:to>
+                                        <p:strVal val="visible"/>
+                                      </p:to>
+                                    </p:set>
+                                  </p:childTnLst>
+                                </p:cTn>
+                              </p:par>
+                              <p:par>
+                                <p:cTn id="47" presetID="1" presetClass="entr" presetSubtype="0" fill="hold" nodeType="withEffect">
+                                  <p:stCondLst>
+                                    <p:cond delay="0"/>
+                                  </p:stCondLst>
+                                  <p:childTnLst>
+                                    <p:set>
+                                      <p:cBhvr>
+                                        <p:cTn id="48" dur="1" fill="hold">
+                                          <p:stCondLst>
+                                            <p:cond delay="0"/>
+                                          </p:stCondLst>
+                                        </p:cTn>
+                                        <p:tgtEl>
+                                          <p:spTgt spid="25"/>
+                                        </p:tgtEl>
+                                        <p:attrNameLst>
+                                          <p:attrName>style.visibility</p:attrName>
+                                        </p:attrNameLst>
+                                      </p:cBhvr>
+                                      <p:to>
+                                        <p:strVal val="visible"/>
+                                      </p:to>
+                                    </p:set>
+                                  </p:childTnLst>
+                                </p:cTn>
+                              </p:par>
+                            </p:childTnLst>
+                          </p:cTn>
+                        </p:par>
+                      </p:childTnLst>
+                    </p:cTn>
+                  </p:par>
+                  <p:par>
+                    <p:cTn id="49" fill="hold">
+                      <p:stCondLst>
+                        <p:cond delay="indefinite"/>
+                      </p:stCondLst>
+                      <p:childTnLst>
+                        <p:par>
+                          <p:cTn id="50" fill="hold">
+                            <p:stCondLst>
+                              <p:cond delay="0"/>
+                            </p:stCondLst>
+                            <p:childTnLst>
+                              <p:par>
+                                <p:cTn id="51" presetID="1" presetClass="entr" presetSubtype="0" fill="hold" grpId="0" nodeType="clickEffect">
+                                  <p:stCondLst>
+                                    <p:cond delay="0"/>
+                                  </p:stCondLst>
+                                  <p:childTnLst>
+                                    <p:set>
+                                      <p:cBhvr>
+                                        <p:cTn id="52" dur="1" fill="hold">
+                                          <p:stCondLst>
+                                            <p:cond delay="0"/>
+                                          </p:stCondLst>
+                                        </p:cTn>
+                                        <p:tgtEl>
+                                          <p:spTgt spid="26"/>
+                                        </p:tgtEl>
+                                        <p:attrNameLst>
+                                          <p:attrName>style.visibility</p:attrName>
+                                        </p:attrNameLst>
+                                      </p:cBhvr>
+                                      <p:to>
+                                        <p:strVal val="visible"/>
+                                      </p:to>
+                                    </p:set>
+                                  </p:childTnLst>
+                                </p:cTn>
+                              </p:par>
+                            </p:childTnLst>
+                          </p:cTn>
+                        </p:par>
+                      </p:childTnLst>
+                    </p:cTn>
+                  </p:par>
+                </p:childTnLst>
+              </p:cTn>
+              <p:prevCondLst>
+                <p:cond evt="onPrev" delay="0">
+                  <p:tgtEl>
+                    <p:sldTgt/>
+                  </p:tgtEl>
+                </p:cond>
+              </p:prevCondLst>
+              <p:nextCondLst>
+                <p:cond evt="onNext" delay="0">
+                  <p:tgtEl>
+                    <p:sldTgt/>
+                  </p:tgtEl>
+                </p:cond>
+              </p:nextCondLst>
+            </p:seq>
+          </p:childTnLst>
+        </p:cTn>
+      </p:par>
+    </p:tnLst>
+    <p:bldLst>
+      <p:bldP spid="4" grpId="0" uiExpand="1" build="p"/>
+      <p:bldP spid="26" grpId="0"/>
+    </p:bldLst>
+  </p:timing>
 </p:sld>
 </file>
 
@@ -29850,20 +31009,20 @@
 </file>
 
 <file path=customXml/item1.xml><?xml version="1.0" encoding="utf-8"?>
+<p:properties xmlns:p="http://schemas.microsoft.com/office/2006/metadata/properties" xmlns:xsi="http://www.w3.org/2001/XMLSchema-instance" xmlns:pc="http://schemas.microsoft.com/office/infopath/2007/PartnerControls">
+  <documentManagement>
+    <MediaServiceKeyPoints xmlns="71af3243-3dd4-4a8d-8c0d-dd76da1f02a5" xsi:nil="true"/>
+  </documentManagement>
+</p:properties>
+</file>
+
+<file path=customXml/item2.xml><?xml version="1.0" encoding="utf-8"?>
 <?mso-contentType ?>
 <FormTemplates xmlns="http://schemas.microsoft.com/sharepoint/v3/contenttype/forms">
   <Display>DocumentLibraryForm</Display>
   <Edit>DocumentLibraryForm</Edit>
   <New>DocumentLibraryForm</New>
 </FormTemplates>
-</file>
-
-<file path=customXml/item2.xml><?xml version="1.0" encoding="utf-8"?>
-<p:properties xmlns:p="http://schemas.microsoft.com/office/2006/metadata/properties" xmlns:xsi="http://www.w3.org/2001/XMLSchema-instance" xmlns:pc="http://schemas.microsoft.com/office/infopath/2007/PartnerControls">
-  <documentManagement>
-    <MediaServiceKeyPoints xmlns="71af3243-3dd4-4a8d-8c0d-dd76da1f02a5" xsi:nil="true"/>
-  </documentManagement>
-</p:properties>
 </file>
 
 <file path=customXml/item3.xml><?xml version="1.0" encoding="utf-8"?>
@@ -30078,19 +31237,19 @@
 </file>
 
 <file path=customXml/itemProps1.xml><?xml version="1.0" encoding="utf-8"?>
-<ds:datastoreItem xmlns:ds="http://schemas.openxmlformats.org/officeDocument/2006/customXml" ds:itemID="{5B26E0C9-B2AA-42E6-97B6-E1B7D9EAF129}">
+<ds:datastoreItem xmlns:ds="http://schemas.openxmlformats.org/officeDocument/2006/customXml" ds:itemID="{F5757914-1161-4661-9696-421FD6935CDD}">
   <ds:schemaRefs>
-    <ds:schemaRef ds:uri="http://schemas.microsoft.com/sharepoint/v3/contenttype/forms"/>
+    <ds:schemaRef ds:uri="http://schemas.microsoft.com/office/2006/metadata/properties"/>
+    <ds:schemaRef ds:uri="http://schemas.microsoft.com/office/infopath/2007/PartnerControls"/>
+    <ds:schemaRef ds:uri="71af3243-3dd4-4a8d-8c0d-dd76da1f02a5"/>
   </ds:schemaRefs>
 </ds:datastoreItem>
 </file>
 
 <file path=customXml/itemProps2.xml><?xml version="1.0" encoding="utf-8"?>
-<ds:datastoreItem xmlns:ds="http://schemas.openxmlformats.org/officeDocument/2006/customXml" ds:itemID="{F5757914-1161-4661-9696-421FD6935CDD}">
+<ds:datastoreItem xmlns:ds="http://schemas.openxmlformats.org/officeDocument/2006/customXml" ds:itemID="{5B26E0C9-B2AA-42E6-97B6-E1B7D9EAF129}">
   <ds:schemaRefs>
-    <ds:schemaRef ds:uri="http://schemas.microsoft.com/office/2006/metadata/properties"/>
-    <ds:schemaRef ds:uri="http://schemas.microsoft.com/office/infopath/2007/PartnerControls"/>
-    <ds:schemaRef ds:uri="71af3243-3dd4-4a8d-8c0d-dd76da1f02a5"/>
+    <ds:schemaRef ds:uri="http://schemas.microsoft.com/sharepoint/v3/contenttype/forms"/>
   </ds:schemaRefs>
 </ds:datastoreItem>
 </file>

</xml_diff>